<commit_message>
feat(api): add single endpoint to generate .pptx from prompt and text input
</commit_message>
<xml_diff>
--- a/output/The_Benefits_of_Having_Cats_at_Home.pptx
+++ b/output/The_Benefits_of_Having_Cats_at_Home.pptx
@@ -3422,7 +3422,7 @@
           <a:lstStyle/>
           <a:p>
             <a:r>
-              <a:t>Cats' Hunting Abilities</a:t>
+              <a:t>Historical Significance of Cats</a:t>
             </a:r>
           </a:p>
         </p:txBody>
@@ -3446,7 +3446,7 @@
               <a:defRPr sz="1800"/>
             </a:pPr>
             <a:r>
-              <a:t>Excellent night vision</a:t>
+              <a:t>Domesticated around 7500 BC</a:t>
             </a:r>
           </a:p>
           <a:p>
@@ -3454,7 +3454,7 @@
               <a:defRPr sz="1800"/>
             </a:pPr>
             <a:r>
-              <a:t>Can hear ultrasonic sounds</a:t>
+              <a:t>Worshipped in ancient Egypt</a:t>
             </a:r>
           </a:p>
           <a:p>
@@ -3462,7 +3462,7 @@
               <a:defRPr sz="1800"/>
             </a:pPr>
             <a:r>
-              <a:t>Effective vermin control</a:t>
+              <a:t>Cultural symbols of protection</a:t>
             </a:r>
           </a:p>
           <a:p/>
@@ -3475,7 +3475,7 @@
               </a:defRPr>
             </a:pPr>
             <a:r>
-              <a:t>Cats' natural hunting skills make them great for pest control.</a:t>
+              <a:t>Cats have been revered throughout history for their unique qualities.</a:t>
             </a:r>
           </a:p>
         </p:txBody>
@@ -3514,7 +3514,7 @@
           <a:lstStyle/>
           <a:p>
             <a:r>
-              <a:t>Step-by-Step: Introducing a Cat to Your Home</a:t>
+              <a:t>Fun Facts About Cats</a:t>
             </a:r>
           </a:p>
         </p:txBody>
@@ -3538,7 +3538,7 @@
               <a:defRPr sz="1800"/>
             </a:pPr>
             <a:r>
-              <a:t>&gt;&gt; Prepare a safe space</a:t>
+              <a:t>A group of cats is called a clowder</a:t>
             </a:r>
           </a:p>
           <a:p>
@@ -3546,7 +3546,7 @@
               <a:defRPr sz="1800"/>
             </a:pPr>
             <a:r>
-              <a:t>&gt;&gt; Gradually introduce to family members</a:t>
+              <a:t>Cats can hear ultrasonic sounds</a:t>
             </a:r>
           </a:p>
           <a:p>
@@ -3554,15 +3554,7 @@
               <a:defRPr sz="1800"/>
             </a:pPr>
             <a:r>
-              <a:t>&gt;&gt; Establish a feeding and play routine</a:t>
-            </a:r>
-          </a:p>
-          <a:p>
-            <a:pPr>
-              <a:defRPr sz="1800"/>
-            </a:pPr>
-            <a:r>
-              <a:t>&gt;&gt; Monitor health and behavior</a:t>
+              <a:t>Excellent night vision</a:t>
             </a:r>
           </a:p>
           <a:p/>
@@ -3575,7 +3567,7 @@
               </a:defRPr>
             </a:pPr>
             <a:r>
-              <a:t>A smooth introduction ensures a happy and healthy cat.</a:t>
+              <a:t>Cats are fascinating creatures with unique abilities.</a:t>
             </a:r>
           </a:p>
         </p:txBody>
@@ -3638,7 +3630,7 @@
               <a:defRPr sz="1800"/>
             </a:pPr>
             <a:r>
-              <a:t>Cats offer companionship and emotional support</a:t>
+              <a:t>Cats provide companionship and emotional support</a:t>
             </a:r>
           </a:p>
           <a:p>
@@ -3646,7 +3638,7 @@
               <a:defRPr sz="1800"/>
             </a:pPr>
             <a:r>
-              <a:t>Their behaviors and skills make them unique pets</a:t>
+              <a:t>Their behaviors and history enrich our lives</a:t>
             </a:r>
           </a:p>
           <a:p>
@@ -3654,7 +3646,7 @@
               <a:defRPr sz="1800"/>
             </a:pPr>
             <a:r>
-              <a:t>Cats have a rich history and cultural significance</a:t>
+              <a:t>Cats are beneficial for mental health</a:t>
             </a:r>
           </a:p>
           <a:p/>
@@ -3667,7 +3659,7 @@
               </a:defRPr>
             </a:pPr>
             <a:r>
-              <a:t>Cats are more than just pets; they are companions with a rich history and unique abilities.</a:t>
+              <a:t>Cats are more than pets; they're partners in well-being.</a:t>
             </a:r>
           </a:p>
         </p:txBody>
@@ -3730,7 +3722,7 @@
               <a:defRPr sz="1800"/>
             </a:pPr>
             <a:r>
-              <a:t>Cats are wonderful additions to any home</a:t>
+              <a:t>Cats are ideal companions for many households</a:t>
             </a:r>
           </a:p>
           <a:p>
@@ -3738,7 +3730,7 @@
               <a:defRPr sz="1800"/>
             </a:pPr>
             <a:r>
-              <a:t>They provide both companionship and practical benefits</a:t>
+              <a:t>They offer emotional and physical benefits</a:t>
             </a:r>
           </a:p>
           <a:p/>
@@ -3751,7 +3743,7 @@
               </a:defRPr>
             </a:pPr>
             <a:r>
-              <a:t>Consider adopting a cat to enrich your life and home.</a:t>
+              <a:t>Consider adopting a cat for a happier, healthier home.</a:t>
             </a:r>
           </a:p>
         </p:txBody>
@@ -3822,7 +3814,7 @@
               <a:defRPr sz="1800"/>
             </a:pPr>
             <a:r>
-              <a:t>Feel free to share your cat stories!</a:t>
+              <a:t>Let's celebrate our feline friends!</a:t>
             </a:r>
           </a:p>
           <a:p/>
@@ -3934,7 +3926,7 @@
           <a:lstStyle/>
           <a:p>
             <a:r>
-              <a:t>Welcome to the World of Cats!</a:t>
+              <a:t>Welcome to Our Feline Friends</a:t>
             </a:r>
           </a:p>
         </p:txBody>
@@ -3979,7 +3971,7 @@
               </a:defRPr>
             </a:pPr>
             <a:r>
-              <a:t>Did you know? A group of cats is called a clowder. Let's explore why these furry friends make great companions!</a:t>
+              <a:t>Cats are more than just pets; they're companions that bring joy and comfort.</a:t>
             </a:r>
           </a:p>
         </p:txBody>
@@ -4018,7 +4010,7 @@
           <a:lstStyle/>
           <a:p>
             <a:r>
-              <a:t>Why Cats Make Great Pets</a:t>
+              <a:t>Why Cats Make Great House Pets</a:t>
             </a:r>
           </a:p>
         </p:txBody>
@@ -4042,7 +4034,7 @@
               <a:defRPr sz="1800"/>
             </a:pPr>
             <a:r>
-              <a:t>Independent yet affectionate</a:t>
+              <a:t>Low maintenance compared to dogs</a:t>
             </a:r>
           </a:p>
           <a:p>
@@ -4050,7 +4042,7 @@
               <a:defRPr sz="1800"/>
             </a:pPr>
             <a:r>
-              <a:t>Low maintenance compared to dogs</a:t>
+              <a:t>Independent yet affectionate</a:t>
             </a:r>
           </a:p>
           <a:p>
@@ -4071,7 +4063,7 @@
               </a:defRPr>
             </a:pPr>
             <a:r>
-              <a:t>Cats offer a perfect balance of independence and companionship.</a:t>
+              <a:t>Cats offer companionship without demanding constant attention.</a:t>
             </a:r>
           </a:p>
         </p:txBody>
@@ -4134,7 +4126,7 @@
               <a:defRPr sz="1800"/>
             </a:pPr>
             <a:r>
-              <a:t>Provide emotional support</a:t>
+              <a:t>Purring can be calming</a:t>
             </a:r>
           </a:p>
           <a:p>
@@ -4142,7 +4134,7 @@
               <a:defRPr sz="1800"/>
             </a:pPr>
             <a:r>
-              <a:t>Purring can be calming</a:t>
+              <a:t>Provide a sense of routine</a:t>
             </a:r>
           </a:p>
           <a:p>
@@ -4150,7 +4142,7 @@
               <a:defRPr sz="1800"/>
             </a:pPr>
             <a:r>
-              <a:t>Encourage routine and responsibility</a:t>
+              <a:t>Offer non-judgmental companionship</a:t>
             </a:r>
           </a:p>
           <a:p/>
@@ -4163,7 +4155,7 @@
               </a:defRPr>
             </a:pPr>
             <a:r>
-              <a:t>Cats can be a soothing presence for those struggling with anxiety.</a:t>
+              <a:t>Cats can be a soothing presence for those with anxiety.</a:t>
             </a:r>
           </a:p>
         </p:txBody>
@@ -4202,7 +4194,7 @@
           <a:lstStyle/>
           <a:p>
             <a:r>
-              <a:t>Case Study: Cats in Therapy</a:t>
+              <a:t>The Science Behind the Purr</a:t>
             </a:r>
           </a:p>
         </p:txBody>
@@ -4226,7 +4218,7 @@
               <a:defRPr sz="1800"/>
             </a:pPr>
             <a:r>
-              <a:t>Therapy cats in hospitals</a:t>
+              <a:t>Purring vibrations can reduce stress</a:t>
             </a:r>
           </a:p>
           <a:p>
@@ -4234,7 +4226,7 @@
               <a:defRPr sz="1800"/>
             </a:pPr>
             <a:r>
-              <a:t>Positive impact on patients' mental health</a:t>
+              <a:t>Lower blood pressure</a:t>
             </a:r>
           </a:p>
           <a:p>
@@ -4242,7 +4234,7 @@
               <a:defRPr sz="1800"/>
             </a:pPr>
             <a:r>
-              <a:t>Increased feelings of comfort and safety</a:t>
+              <a:t>Promote healing</a:t>
             </a:r>
           </a:p>
           <a:p/>
@@ -4255,7 +4247,7 @@
               </a:defRPr>
             </a:pPr>
             <a:r>
-              <a:t>Cats are increasingly used in therapeutic settings to aid mental health.</a:t>
+              <a:t>The purr of a cat is not just comforting; it's scientifically beneficial.</a:t>
             </a:r>
           </a:p>
         </p:txBody>
@@ -4294,7 +4286,7 @@
           <a:lstStyle/>
           <a:p>
             <a:r>
-              <a:t>Unique Cat Behaviors</a:t>
+              <a:t>Case Study: Cats in Therapy</a:t>
             </a:r>
           </a:p>
         </p:txBody>
@@ -4318,7 +4310,7 @@
               <a:defRPr sz="1800"/>
             </a:pPr>
             <a:r>
-              <a:t>Kneading with paws</a:t>
+              <a:t>Therapy cats in hospitals</a:t>
             </a:r>
           </a:p>
           <a:p>
@@ -4326,7 +4318,7 @@
               <a:defRPr sz="1800"/>
             </a:pPr>
             <a:r>
-              <a:t>Hiding in small spaces</a:t>
+              <a:t>Positive impact on patients' mental health</a:t>
             </a:r>
           </a:p>
           <a:p>
@@ -4334,7 +4326,7 @@
               <a:defRPr sz="1800"/>
             </a:pPr>
             <a:r>
-              <a:t>Sudden energy bursts ('zoomies')</a:t>
+              <a:t>Increased patient interaction</a:t>
             </a:r>
           </a:p>
           <a:p/>
@@ -4347,7 +4339,7 @@
               </a:defRPr>
             </a:pPr>
             <a:r>
-              <a:t>These quirky behaviors can bring joy and laughter to a household.</a:t>
+              <a:t>Cats are increasingly used in therapeutic settings to aid recovery.</a:t>
             </a:r>
           </a:p>
         </p:txBody>
@@ -4386,7 +4378,7 @@
           <a:lstStyle/>
           <a:p>
             <a:r>
-              <a:t>Cats' Communication Skills</a:t>
+              <a:t>Cats' Unique Behaviors</a:t>
             </a:r>
           </a:p>
         </p:txBody>
@@ -4410,7 +4402,7 @@
               <a:defRPr sz="1800"/>
             </a:pPr>
             <a:r>
-              <a:t>Vocalizations: meowing and purring</a:t>
+              <a:t>Kneading as a sign of contentment</a:t>
             </a:r>
           </a:p>
           <a:p>
@@ -4418,7 +4410,15 @@
               <a:defRPr sz="1800"/>
             </a:pPr>
             <a:r>
-              <a:t>Body language: tail movements, ear positions</a:t>
+              <a:t>Zoomies as a playful energy release</a:t>
+            </a:r>
+          </a:p>
+          <a:p>
+            <a:pPr>
+              <a:defRPr sz="1800"/>
+            </a:pPr>
+            <a:r>
+              <a:t>Hiding in small spaces for comfort</a:t>
             </a:r>
           </a:p>
           <a:p/>
@@ -4431,7 +4431,7 @@
               </a:defRPr>
             </a:pPr>
             <a:r>
-              <a:t>Understanding cat communication can strengthen the bond between cat and owner.</a:t>
+              <a:t>Understanding cat behaviors can enhance the human-cat bond.</a:t>
             </a:r>
           </a:p>
         </p:txBody>
@@ -4470,7 +4470,7 @@
           <a:lstStyle/>
           <a:p>
             <a:r>
-              <a:t>Historical Significance of Cats</a:t>
+              <a:t>Step-by-Step: Introducing a Cat to Your Home</a:t>
             </a:r>
           </a:p>
         </p:txBody>
@@ -4494,7 +4494,7 @@
               <a:defRPr sz="1800"/>
             </a:pPr>
             <a:r>
-              <a:t>Domesticated around 7500 BC in the Near East</a:t>
+              <a:t>&gt;&gt; Prepare a safe space</a:t>
             </a:r>
           </a:p>
           <a:p>
@@ -4502,7 +4502,7 @@
               <a:defRPr sz="1800"/>
             </a:pPr>
             <a:r>
-              <a:t>Worshipped in ancient Egypt</a:t>
+              <a:t>&gt;&gt; Gradually introduce to family members</a:t>
             </a:r>
           </a:p>
           <a:p>
@@ -4510,7 +4510,15 @@
               <a:defRPr sz="1800"/>
             </a:pPr>
             <a:r>
-              <a:t>Mummification and legal protection</a:t>
+              <a:t>&gt;&gt; Establish a feeding and play routine</a:t>
+            </a:r>
+          </a:p>
+          <a:p>
+            <a:pPr>
+              <a:defRPr sz="1800"/>
+            </a:pPr>
+            <a:r>
+              <a:t>&gt;&gt; Monitor health and behavior</a:t>
             </a:r>
           </a:p>
           <a:p/>
@@ -4523,7 +4531,7 @@
               </a:defRPr>
             </a:pPr>
             <a:r>
-              <a:t>Cats have been valued companions throughout history.</a:t>
+              <a:t>A smooth introduction ensures a happy home for your new cat.</a:t>
             </a:r>
           </a:p>
         </p:txBody>

</xml_diff>

<commit_message>
fix(builder): ensure output folder exists before saving .pptx presentation
</commit_message>
<xml_diff>
--- a/output/The_Benefits_of_Having_Cats_at_Home.pptx
+++ b/output/The_Benefits_of_Having_Cats_at_Home.pptx
@@ -3422,7 +3422,7 @@
           <a:lstStyle/>
           <a:p>
             <a:r>
-              <a:t>Historical Significance of Cats</a:t>
+              <a:t>Cats' Physical Abilities</a:t>
             </a:r>
           </a:p>
         </p:txBody>
@@ -3446,7 +3446,7 @@
               <a:defRPr sz="1800"/>
             </a:pPr>
             <a:r>
-              <a:t>Domesticated around 7500 BC</a:t>
+              <a:t>Excellent night vision</a:t>
             </a:r>
           </a:p>
           <a:p>
@@ -3454,7 +3454,7 @@
               <a:defRPr sz="1800"/>
             </a:pPr>
             <a:r>
-              <a:t>Worshipped in ancient Egypt</a:t>
+              <a:t>Hear ultrasonic sounds</a:t>
             </a:r>
           </a:p>
           <a:p>
@@ -3462,7 +3462,7 @@
               <a:defRPr sz="1800"/>
             </a:pPr>
             <a:r>
-              <a:t>Cultural symbols of protection</a:t>
+              <a:t>Agility and hunting skills</a:t>
             </a:r>
           </a:p>
           <a:p/>
@@ -3475,7 +3475,7 @@
               </a:defRPr>
             </a:pPr>
             <a:r>
-              <a:t>Cats have been revered throughout history for their unique qualities.</a:t>
+              <a:t>Cats are equipped with remarkable physical traits.</a:t>
             </a:r>
           </a:p>
         </p:txBody>
@@ -3514,7 +3514,7 @@
           <a:lstStyle/>
           <a:p>
             <a:r>
-              <a:t>Fun Facts About Cats</a:t>
+              <a:t>Step-by-Step: Introducing a Cat to Your Home</a:t>
             </a:r>
           </a:p>
         </p:txBody>
@@ -3538,7 +3538,7 @@
               <a:defRPr sz="1800"/>
             </a:pPr>
             <a:r>
-              <a:t>A group of cats is called a clowder</a:t>
+              <a:t>&gt;&gt; Prepare a safe space</a:t>
             </a:r>
           </a:p>
           <a:p>
@@ -3546,7 +3546,7 @@
               <a:defRPr sz="1800"/>
             </a:pPr>
             <a:r>
-              <a:t>Cats can hear ultrasonic sounds</a:t>
+              <a:t>&gt;&gt; Gradually introduce to family members</a:t>
             </a:r>
           </a:p>
           <a:p>
@@ -3554,7 +3554,15 @@
               <a:defRPr sz="1800"/>
             </a:pPr>
             <a:r>
-              <a:t>Excellent night vision</a:t>
+              <a:t>&gt;&gt; Establish a feeding routine</a:t>
+            </a:r>
+          </a:p>
+          <a:p>
+            <a:pPr>
+              <a:defRPr sz="1800"/>
+            </a:pPr>
+            <a:r>
+              <a:t>&gt;&gt; Provide toys and scratching posts</a:t>
             </a:r>
           </a:p>
           <a:p/>
@@ -3567,7 +3575,7 @@
               </a:defRPr>
             </a:pPr>
             <a:r>
-              <a:t>Cats are fascinating creatures with unique abilities.</a:t>
+              <a:t>A smooth introduction ensures a happy home for your cat.</a:t>
             </a:r>
           </a:p>
         </p:txBody>
@@ -3630,7 +3638,7 @@
               <a:defRPr sz="1800"/>
             </a:pPr>
             <a:r>
-              <a:t>Cats provide companionship and emotional support</a:t>
+              <a:t>Cats offer companionship and anxiety relief</a:t>
             </a:r>
           </a:p>
           <a:p>
@@ -3638,7 +3646,7 @@
               <a:defRPr sz="1800"/>
             </a:pPr>
             <a:r>
-              <a:t>Their behaviors and history enrich our lives</a:t>
+              <a:t>Unique behaviors and communication</a:t>
             </a:r>
           </a:p>
           <a:p>
@@ -3646,7 +3654,7 @@
               <a:defRPr sz="1800"/>
             </a:pPr>
             <a:r>
-              <a:t>Cats are beneficial for mental health</a:t>
+              <a:t>Historical and cultural significance</a:t>
             </a:r>
           </a:p>
           <a:p/>
@@ -3659,7 +3667,7 @@
               </a:defRPr>
             </a:pPr>
             <a:r>
-              <a:t>Cats are more than pets; they're partners in well-being.</a:t>
+              <a:t>Cats are more than just pets; they are companions with rich histories.</a:t>
             </a:r>
           </a:p>
         </p:txBody>
@@ -3722,7 +3730,7 @@
               <a:defRPr sz="1800"/>
             </a:pPr>
             <a:r>
-              <a:t>Cats are ideal companions for many households</a:t>
+              <a:t>Cats are ideal for various lifestyles</a:t>
             </a:r>
           </a:p>
           <a:p>
@@ -3730,7 +3738,7 @@
               <a:defRPr sz="1800"/>
             </a:pPr>
             <a:r>
-              <a:t>They offer emotional and physical benefits</a:t>
+              <a:t>They provide emotional support and entertainment</a:t>
             </a:r>
           </a:p>
           <a:p/>
@@ -3743,7 +3751,7 @@
               </a:defRPr>
             </a:pPr>
             <a:r>
-              <a:t>Consider adopting a cat for a happier, healthier home.</a:t>
+              <a:t>Consider adopting a cat for a fulfilling companionship.</a:t>
             </a:r>
           </a:p>
         </p:txBody>
@@ -3814,7 +3822,7 @@
               <a:defRPr sz="1800"/>
             </a:pPr>
             <a:r>
-              <a:t>Let's celebrate our feline friends!</a:t>
+              <a:t>Let's discuss the joys of having cats!</a:t>
             </a:r>
           </a:p>
           <a:p/>
@@ -3926,7 +3934,7 @@
           <a:lstStyle/>
           <a:p>
             <a:r>
-              <a:t>Welcome to Our Feline Friends</a:t>
+              <a:t>Welcome to the World of Cats!</a:t>
             </a:r>
           </a:p>
         </p:txBody>
@@ -3971,7 +3979,7 @@
               </a:defRPr>
             </a:pPr>
             <a:r>
-              <a:t>Cats are more than just pets; they're companions that bring joy and comfort.</a:t>
+              <a:t>Did you know? A group of cats is called a clowder!</a:t>
             </a:r>
           </a:p>
         </p:txBody>
@@ -4010,7 +4018,7 @@
           <a:lstStyle/>
           <a:p>
             <a:r>
-              <a:t>Why Cats Make Great House Pets</a:t>
+              <a:t>Why Cats Make Great Pets</a:t>
             </a:r>
           </a:p>
         </p:txBody>
@@ -4034,7 +4042,7 @@
               <a:defRPr sz="1800"/>
             </a:pPr>
             <a:r>
-              <a:t>Low maintenance compared to dogs</a:t>
+              <a:t>Independent and low maintenance</a:t>
             </a:r>
           </a:p>
           <a:p>
@@ -4042,7 +4050,7 @@
               <a:defRPr sz="1800"/>
             </a:pPr>
             <a:r>
-              <a:t>Independent yet affectionate</a:t>
+              <a:t>Provide companionship</a:t>
             </a:r>
           </a:p>
           <a:p>
@@ -4050,7 +4058,7 @@
               <a:defRPr sz="1800"/>
             </a:pPr>
             <a:r>
-              <a:t>Great for small living spaces</a:t>
+              <a:t>Natural hunters</a:t>
             </a:r>
           </a:p>
           <a:p/>
@@ -4063,7 +4071,7 @@
               </a:defRPr>
             </a:pPr>
             <a:r>
-              <a:t>Cats offer companionship without demanding constant attention.</a:t>
+              <a:t>Cats are perfect for those who appreciate independence and companionship.</a:t>
             </a:r>
           </a:p>
         </p:txBody>
@@ -4194,7 +4202,7 @@
           <a:lstStyle/>
           <a:p>
             <a:r>
-              <a:t>The Science Behind the Purr</a:t>
+              <a:t>Case Study: Cats in Therapy</a:t>
             </a:r>
           </a:p>
         </p:txBody>
@@ -4218,7 +4226,7 @@
               <a:defRPr sz="1800"/>
             </a:pPr>
             <a:r>
-              <a:t>Purring vibrations can reduce stress</a:t>
+              <a:t>Therapy cats in hospitals</a:t>
             </a:r>
           </a:p>
           <a:p>
@@ -4226,7 +4234,7 @@
               <a:defRPr sz="1800"/>
             </a:pPr>
             <a:r>
-              <a:t>Lower blood pressure</a:t>
+              <a:t>Emotional support animals</a:t>
             </a:r>
           </a:p>
           <a:p>
@@ -4234,7 +4242,7 @@
               <a:defRPr sz="1800"/>
             </a:pPr>
             <a:r>
-              <a:t>Promote healing</a:t>
+              <a:t>Positive impact on mental health</a:t>
             </a:r>
           </a:p>
           <a:p/>
@@ -4247,7 +4255,7 @@
               </a:defRPr>
             </a:pPr>
             <a:r>
-              <a:t>The purr of a cat is not just comforting; it's scientifically beneficial.</a:t>
+              <a:t>Cats are increasingly used in therapeutic settings to aid mental health.</a:t>
             </a:r>
           </a:p>
         </p:txBody>
@@ -4286,7 +4294,7 @@
           <a:lstStyle/>
           <a:p>
             <a:r>
-              <a:t>Case Study: Cats in Therapy</a:t>
+              <a:t>Unique Cat Behaviors</a:t>
             </a:r>
           </a:p>
         </p:txBody>
@@ -4310,7 +4318,7 @@
               <a:defRPr sz="1800"/>
             </a:pPr>
             <a:r>
-              <a:t>Therapy cats in hospitals</a:t>
+              <a:t>Kneading with paws</a:t>
             </a:r>
           </a:p>
           <a:p>
@@ -4318,7 +4326,7 @@
               <a:defRPr sz="1800"/>
             </a:pPr>
             <a:r>
-              <a:t>Positive impact on patients' mental health</a:t>
+              <a:t>Zoomies: sudden energy bursts</a:t>
             </a:r>
           </a:p>
           <a:p>
@@ -4326,7 +4334,7 @@
               <a:defRPr sz="1800"/>
             </a:pPr>
             <a:r>
-              <a:t>Increased patient interaction</a:t>
+              <a:t>Hiding in small spaces</a:t>
             </a:r>
           </a:p>
           <a:p/>
@@ -4339,7 +4347,7 @@
               </a:defRPr>
             </a:pPr>
             <a:r>
-              <a:t>Cats are increasingly used in therapeutic settings to aid recovery.</a:t>
+              <a:t>These behaviors can be entertaining and comforting.</a:t>
             </a:r>
           </a:p>
         </p:txBody>
@@ -4378,7 +4386,7 @@
           <a:lstStyle/>
           <a:p>
             <a:r>
-              <a:t>Cats' Unique Behaviors</a:t>
+              <a:t>Cats' Communication Methods</a:t>
             </a:r>
           </a:p>
         </p:txBody>
@@ -4402,7 +4410,7 @@
               <a:defRPr sz="1800"/>
             </a:pPr>
             <a:r>
-              <a:t>Kneading as a sign of contentment</a:t>
+              <a:t>Vocalizations: meowing and purring</a:t>
             </a:r>
           </a:p>
           <a:p>
@@ -4410,7 +4418,7 @@
               <a:defRPr sz="1800"/>
             </a:pPr>
             <a:r>
-              <a:t>Zoomies as a playful energy release</a:t>
+              <a:t>Body language</a:t>
             </a:r>
           </a:p>
           <a:p>
@@ -4418,7 +4426,7 @@
               <a:defRPr sz="1800"/>
             </a:pPr>
             <a:r>
-              <a:t>Hiding in small spaces for comfort</a:t>
+              <a:t>Tail movements</a:t>
             </a:r>
           </a:p>
           <a:p/>
@@ -4431,7 +4439,7 @@
               </a:defRPr>
             </a:pPr>
             <a:r>
-              <a:t>Understanding cat behaviors can enhance the human-cat bond.</a:t>
+              <a:t>Understanding cat communication can enhance the human-cat bond.</a:t>
             </a:r>
           </a:p>
         </p:txBody>
@@ -4470,7 +4478,7 @@
           <a:lstStyle/>
           <a:p>
             <a:r>
-              <a:t>Step-by-Step: Introducing a Cat to Your Home</a:t>
+              <a:t>Historical Significance of Cats</a:t>
             </a:r>
           </a:p>
         </p:txBody>
@@ -4494,7 +4502,7 @@
               <a:defRPr sz="1800"/>
             </a:pPr>
             <a:r>
-              <a:t>&gt;&gt; Prepare a safe space</a:t>
+              <a:t>Domesticated around 7500 BC</a:t>
             </a:r>
           </a:p>
           <a:p>
@@ -4502,7 +4510,7 @@
               <a:defRPr sz="1800"/>
             </a:pPr>
             <a:r>
-              <a:t>&gt;&gt; Gradually introduce to family members</a:t>
+              <a:t>Worshipped in ancient Egypt</a:t>
             </a:r>
           </a:p>
           <a:p>
@@ -4510,15 +4518,7 @@
               <a:defRPr sz="1800"/>
             </a:pPr>
             <a:r>
-              <a:t>&gt;&gt; Establish a feeding and play routine</a:t>
-            </a:r>
-          </a:p>
-          <a:p>
-            <a:pPr>
-              <a:defRPr sz="1800"/>
-            </a:pPr>
-            <a:r>
-              <a:t>&gt;&gt; Monitor health and behavior</a:t>
+              <a:t>Mummification practices</a:t>
             </a:r>
           </a:p>
           <a:p/>
@@ -4531,7 +4531,7 @@
               </a:defRPr>
             </a:pPr>
             <a:r>
-              <a:t>A smooth introduction ensures a happy home for your new cat.</a:t>
+              <a:t>Cats have been valued companions throughout history.</a:t>
             </a:r>
           </a:p>
         </p:txBody>

</xml_diff>